<commit_message>
added weak NP-completeness of Knappsack
</commit_message>
<xml_diff>
--- a/Pseudopolynomielle Algorithmen.pptx
+++ b/Pseudopolynomielle Algorithmen.pptx
@@ -2344,6 +2344,42 @@
               <a:t>Wenn man die Probleme ‚schwer‘ genug macht, ist es völlig egal dass da noch ein n vorne steht, das V wird exponentiell wachsen</a:t>
             </a:r>
           </a:p>
+          <a:p>
+            <a:pPr marL="628650" lvl="1" indent="-171450">
+              <a:buFontTx/>
+              <a:buChar char="-"/>
+            </a:pPr>
+            <a:r>
+              <a:rPr lang="de-DE" dirty="0">
+                <a:sym typeface="Wingdings" panose="05000000000000000000" pitchFamily="2" charset="2"/>
+              </a:rPr>
+              <a:t>Aber: Werte und Gewichte sind meistens </a:t>
+            </a:r>
+            <a:r>
+              <a:rPr lang="de-DE" dirty="0" err="1">
+                <a:sym typeface="Wingdings" panose="05000000000000000000" pitchFamily="2" charset="2"/>
+              </a:rPr>
+              <a:t>duch</a:t>
+            </a:r>
+            <a:r>
+              <a:rPr lang="de-DE" dirty="0">
+                <a:sym typeface="Wingdings" panose="05000000000000000000" pitchFamily="2" charset="2"/>
+              </a:rPr>
+              <a:t> Polynom in n beschränkt, z.B. G &lt;= n^10. Dann lässt sich die Laufzeit für ein Polynom n auf n^11 abschätzen  </a:t>
+            </a:r>
+            <a:r>
+              <a:rPr lang="de-DE" dirty="0" err="1">
+                <a:sym typeface="Wingdings" panose="05000000000000000000" pitchFamily="2" charset="2"/>
+              </a:rPr>
+              <a:t>pseudopolynomialer</a:t>
+            </a:r>
+            <a:r>
+              <a:rPr lang="de-DE" dirty="0">
+                <a:sym typeface="Wingdings" panose="05000000000000000000" pitchFamily="2" charset="2"/>
+              </a:rPr>
+              <a:t> Algorithmus</a:t>
+            </a:r>
+          </a:p>
         </p:txBody>
       </p:sp>
       <p:sp>
@@ -2428,60 +2464,12 @@
           <a:p>
             <a:r>
               <a:rPr lang="de-DE" dirty="0"/>
-              <a:t>Bei diesem Thema bin ich mir nicht ganz sicher (TSP an sich ist NP vollständig)</a:t>
-            </a:r>
-          </a:p>
-          <a:p>
-            <a:endParaRPr lang="de-DE" dirty="0"/>
-          </a:p>
-          <a:p>
-            <a:r>
-              <a:rPr lang="de-DE" dirty="0"/>
-              <a:t>-TSP ist NP vollständig, weil: 1. Es in polynomialer Zeit möglich ist, die Aussage 1 zu verifizieren und 2. Hamilton </a:t>
-            </a:r>
-            <a:r>
-              <a:rPr lang="de-DE" dirty="0" err="1"/>
-              <a:t>cycle</a:t>
-            </a:r>
-            <a:r>
-              <a:rPr lang="de-DE" dirty="0"/>
-              <a:t> auf das TSP Entscheidungsproblem reduzierbar ist?</a:t>
-            </a:r>
-          </a:p>
-          <a:p>
-            <a:endParaRPr lang="de-DE" dirty="0"/>
-          </a:p>
-          <a:p>
-            <a:pPr marL="171450" indent="-171450">
-              <a:buFontTx/>
-              <a:buChar char="-"/>
-            </a:pPr>
-            <a:r>
-              <a:rPr lang="de-DE" dirty="0"/>
-              <a:t>TSP ist stark NP vollständig weil: Zwar ist auch hier der Hamilton-Zyklus auf TSP Optimierungsproblem reduzierbar, ABER: Es gibt keine Möglichkeit, in polynomialer Zeit zu verifizieren, ob der Hamilton-Zyklus h auch wirklich der kürzeste im Ganzen Graph ist, da man dafür alle Möglichkeiten durchprobieren müsste.</a:t>
-            </a:r>
-          </a:p>
-          <a:p>
-            <a:pPr marL="171450" indent="-171450">
-              <a:buFontTx/>
-              <a:buChar char="-"/>
-            </a:pPr>
-            <a:endParaRPr lang="de-DE" dirty="0"/>
-          </a:p>
-          <a:p>
-            <a:pPr marL="171450" indent="-171450">
-              <a:buFontTx/>
-              <a:buChar char="-"/>
-            </a:pPr>
-            <a:r>
-              <a:rPr lang="de-DE" dirty="0"/>
-              <a:t>Hier habe ich mal dargestellt, wie ich mir das vorstelle.</a:t>
-            </a:r>
-          </a:p>
-          <a:p>
-            <a:endParaRPr lang="de-DE" dirty="0"/>
-          </a:p>
-          <a:p>
+              <a:t>So steht es im Buch von </a:t>
+            </a:r>
+            <a:r>
+              <a:rPr lang="de-DE"/>
+              <a:t>Ingo Wegener (Satz 3.5.9)</a:t>
+            </a:r>
             <a:endParaRPr lang="de-DE" dirty="0"/>
           </a:p>
         </p:txBody>
@@ -2503,7 +2491,7 @@
           <a:p>
             <a:fld id="{D15B9CCF-FFA2-46F4-AE87-49E1E1368883}" type="slidenum">
               <a:rPr lang="de-DE" smtClean="0"/>
-              <a:t>20</a:t>
+              <a:t>19</a:t>
             </a:fld>
             <a:endParaRPr lang="de-DE"/>
           </a:p>
@@ -2512,7 +2500,7 @@
     </p:spTree>
     <p:extLst>
       <p:ext uri="{BB962C8B-B14F-4D97-AF65-F5344CB8AC3E}">
-        <p14:creationId xmlns:p14="http://schemas.microsoft.com/office/powerpoint/2010/main" val="111079152"/>
+        <p14:creationId xmlns:p14="http://schemas.microsoft.com/office/powerpoint/2010/main" val="1435985200"/>
       </p:ext>
     </p:extLst>
   </p:cSld>
@@ -2615,34 +2603,7 @@
             </a:pPr>
             <a:r>
               <a:rPr lang="de-DE" dirty="0"/>
-              <a:t>Hier habe ich mal dargestellt, wie ich mir das vorstelle:</a:t>
-            </a:r>
-          </a:p>
-          <a:p>
-            <a:pPr marL="171450" indent="-171450">
-              <a:buFontTx/>
-              <a:buChar char="-"/>
-            </a:pPr>
-            <a:endParaRPr lang="de-DE" dirty="0"/>
-          </a:p>
-          <a:p>
-            <a:pPr marL="171450" indent="-171450">
-              <a:buFontTx/>
-              <a:buChar char="-"/>
-            </a:pPr>
-            <a:r>
-              <a:rPr lang="de-DE" dirty="0"/>
-              <a:t>Es gibt einen Graphen, der die Städte verbindet und eine Kostenfunktion, die die Kosten von A nach B berechnet. Das Ergebnis liegt in der Menge der ganzen Zahlen (Z), wobei auch die Null vorkommen kann.</a:t>
-            </a:r>
-          </a:p>
-          <a:p>
-            <a:pPr marL="171450" indent="-171450">
-              <a:buFontTx/>
-              <a:buChar char="-"/>
-            </a:pPr>
-            <a:r>
-              <a:rPr lang="de-DE" dirty="0"/>
-              <a:t>B ist die Grenze der Kosten die eingehalten werden soll.</a:t>
+              <a:t>Hier habe ich mal dargestellt, wie ich mir das vorstelle.</a:t>
             </a:r>
           </a:p>
           <a:p>
@@ -2670,7 +2631,7 @@
           <a:p>
             <a:fld id="{D15B9CCF-FFA2-46F4-AE87-49E1E1368883}" type="slidenum">
               <a:rPr lang="de-DE" smtClean="0"/>
-              <a:t>21</a:t>
+              <a:t>20</a:t>
             </a:fld>
             <a:endParaRPr lang="de-DE"/>
           </a:p>
@@ -2679,7 +2640,7 @@
     </p:spTree>
     <p:extLst>
       <p:ext uri="{BB962C8B-B14F-4D97-AF65-F5344CB8AC3E}">
-        <p14:creationId xmlns:p14="http://schemas.microsoft.com/office/powerpoint/2010/main" val="3261523018"/>
+        <p14:creationId xmlns:p14="http://schemas.microsoft.com/office/powerpoint/2010/main" val="111079152"/>
       </p:ext>
     </p:extLst>
   </p:cSld>
@@ -2735,7 +2696,7 @@
           <a:p>
             <a:r>
               <a:rPr lang="de-DE" dirty="0"/>
-              <a:t>Zeigen, dass es einen nichtdeterministischen Algorithmus gibt, der TSP in polynomialer Zeit löst.</a:t>
+              <a:t>Bei diesem Thema bin ich mir nicht ganz sicher (TSP an sich ist NP vollständig)</a:t>
             </a:r>
           </a:p>
           <a:p>
@@ -2744,23 +2705,78 @@
           <a:p>
             <a:r>
               <a:rPr lang="de-DE" dirty="0"/>
-              <a:t>Ungerichteten Hamilton-Zyklus auf TSP reduzieren (HZ ist ja NP vollständig)</a:t>
+              <a:t>-TSP ist NP vollständig, weil: 1. Es in polynomialer Zeit möglich ist, die Aussage 1 zu verifizieren und 2. Hamilton </a:t>
+            </a:r>
+            <a:r>
+              <a:rPr lang="de-DE" dirty="0" err="1"/>
+              <a:t>cycle</a:t>
+            </a:r>
+            <a:r>
+              <a:rPr lang="de-DE" dirty="0"/>
+              <a:t> auf das TSP Entscheidungsproblem reduzierbar ist?</a:t>
             </a:r>
           </a:p>
           <a:p>
             <a:endParaRPr lang="de-DE" dirty="0"/>
           </a:p>
           <a:p>
+            <a:pPr marL="171450" indent="-171450">
+              <a:buFontTx/>
+              <a:buChar char="-"/>
+            </a:pPr>
             <a:r>
               <a:rPr lang="de-DE" dirty="0"/>
-              <a:t>Dieser Algorithmus ist einfach, raten </a:t>
-            </a:r>
-            <a:r>
-              <a:rPr lang="de-DE" dirty="0">
-                <a:sym typeface="Wingdings" panose="05000000000000000000" pitchFamily="2" charset="2"/>
-              </a:rPr>
-              <a:t> prüfen  terminieren, falls akzeptabel</a:t>
-            </a:r>
+              <a:t>TSP ist stark NP vollständig weil: Zwar ist auch hier der Hamilton-Zyklus auf TSP Optimierungsproblem reduzierbar, ABER: Es gibt keine Möglichkeit, in polynomialer Zeit zu verifizieren, ob der Hamilton-Zyklus h auch wirklich der kürzeste im Ganzen Graph ist, da man dafür alle Möglichkeiten durchprobieren müsste.</a:t>
+            </a:r>
+          </a:p>
+          <a:p>
+            <a:pPr marL="171450" indent="-171450">
+              <a:buFontTx/>
+              <a:buChar char="-"/>
+            </a:pPr>
+            <a:endParaRPr lang="de-DE" dirty="0"/>
+          </a:p>
+          <a:p>
+            <a:pPr marL="171450" indent="-171450">
+              <a:buFontTx/>
+              <a:buChar char="-"/>
+            </a:pPr>
+            <a:r>
+              <a:rPr lang="de-DE" dirty="0"/>
+              <a:t>Hier habe ich mal dargestellt, wie ich mir das vorstelle:</a:t>
+            </a:r>
+          </a:p>
+          <a:p>
+            <a:pPr marL="171450" indent="-171450">
+              <a:buFontTx/>
+              <a:buChar char="-"/>
+            </a:pPr>
+            <a:endParaRPr lang="de-DE" dirty="0"/>
+          </a:p>
+          <a:p>
+            <a:pPr marL="171450" indent="-171450">
+              <a:buFontTx/>
+              <a:buChar char="-"/>
+            </a:pPr>
+            <a:r>
+              <a:rPr lang="de-DE" dirty="0"/>
+              <a:t>Es gibt einen Graphen, der die Städte verbindet und eine Kostenfunktion, die die Kosten von A nach B berechnet. Das Ergebnis liegt in der Menge der ganzen Zahlen (Z), wobei auch die Null vorkommen kann.</a:t>
+            </a:r>
+          </a:p>
+          <a:p>
+            <a:pPr marL="171450" indent="-171450">
+              <a:buFontTx/>
+              <a:buChar char="-"/>
+            </a:pPr>
+            <a:r>
+              <a:rPr lang="de-DE" dirty="0"/>
+              <a:t>B ist die Grenze der Kosten die eingehalten werden soll.</a:t>
+            </a:r>
+          </a:p>
+          <a:p>
+            <a:endParaRPr lang="de-DE" dirty="0"/>
+          </a:p>
+          <a:p>
             <a:endParaRPr lang="de-DE" dirty="0"/>
           </a:p>
         </p:txBody>
@@ -2782,7 +2798,7 @@
           <a:p>
             <a:fld id="{D15B9CCF-FFA2-46F4-AE87-49E1E1368883}" type="slidenum">
               <a:rPr lang="de-DE" smtClean="0"/>
-              <a:t>22</a:t>
+              <a:t>21</a:t>
             </a:fld>
             <a:endParaRPr lang="de-DE"/>
           </a:p>
@@ -2791,7 +2807,7 @@
     </p:spTree>
     <p:extLst>
       <p:ext uri="{BB962C8B-B14F-4D97-AF65-F5344CB8AC3E}">
-        <p14:creationId xmlns:p14="http://schemas.microsoft.com/office/powerpoint/2010/main" val="1663211797"/>
+        <p14:creationId xmlns:p14="http://schemas.microsoft.com/office/powerpoint/2010/main" val="3261523018"/>
       </p:ext>
     </p:extLst>
   </p:cSld>
@@ -2847,8 +2863,33 @@
           <a:p>
             <a:r>
               <a:rPr lang="de-DE" dirty="0"/>
-              <a:t>Hier habe ich mal gezeigt, wie die Umwandlung gemeint ist</a:t>
-            </a:r>
+              <a:t>Zeigen, dass es einen nichtdeterministischen Algorithmus gibt, der TSP in polynomialer Zeit löst.</a:t>
+            </a:r>
+          </a:p>
+          <a:p>
+            <a:endParaRPr lang="de-DE" dirty="0"/>
+          </a:p>
+          <a:p>
+            <a:r>
+              <a:rPr lang="de-DE" dirty="0"/>
+              <a:t>Ungerichteten Hamilton-Zyklus auf TSP reduzieren (HZ ist ja NP vollständig)</a:t>
+            </a:r>
+          </a:p>
+          <a:p>
+            <a:endParaRPr lang="de-DE" dirty="0"/>
+          </a:p>
+          <a:p>
+            <a:r>
+              <a:rPr lang="de-DE" dirty="0"/>
+              <a:t>Dieser Algorithmus ist einfach, raten </a:t>
+            </a:r>
+            <a:r>
+              <a:rPr lang="de-DE" dirty="0">
+                <a:sym typeface="Wingdings" panose="05000000000000000000" pitchFamily="2" charset="2"/>
+              </a:rPr>
+              <a:t> prüfen  terminieren, falls akzeptabel</a:t>
+            </a:r>
+            <a:endParaRPr lang="de-DE" dirty="0"/>
           </a:p>
         </p:txBody>
       </p:sp>
@@ -2869,7 +2910,7 @@
           <a:p>
             <a:fld id="{D15B9CCF-FFA2-46F4-AE87-49E1E1368883}" type="slidenum">
               <a:rPr lang="de-DE" smtClean="0"/>
-              <a:t>25</a:t>
+              <a:t>22</a:t>
             </a:fld>
             <a:endParaRPr lang="de-DE"/>
           </a:p>
@@ -2878,7 +2919,7 @@
     </p:spTree>
     <p:extLst>
       <p:ext uri="{BB962C8B-B14F-4D97-AF65-F5344CB8AC3E}">
-        <p14:creationId xmlns:p14="http://schemas.microsoft.com/office/powerpoint/2010/main" val="957108521"/>
+        <p14:creationId xmlns:p14="http://schemas.microsoft.com/office/powerpoint/2010/main" val="1663211797"/>
       </p:ext>
     </p:extLst>
   </p:cSld>
@@ -3002,6 +3043,93 @@
     <p:extLst>
       <p:ext uri="{BB962C8B-B14F-4D97-AF65-F5344CB8AC3E}">
         <p14:creationId xmlns:p14="http://schemas.microsoft.com/office/powerpoint/2010/main" val="3149479873"/>
+      </p:ext>
+    </p:extLst>
+  </p:cSld>
+  <p:clrMapOvr>
+    <a:masterClrMapping/>
+  </p:clrMapOvr>
+</p:notes>
+</file>
+
+<file path=ppt/notesSlides/notesSlide20.xml><?xml version="1.0" encoding="utf-8"?>
+<p:notes xmlns:a="http://schemas.openxmlformats.org/drawingml/2006/main" xmlns:r="http://schemas.openxmlformats.org/officeDocument/2006/relationships" xmlns:p="http://schemas.openxmlformats.org/presentationml/2006/main">
+  <p:cSld>
+    <p:spTree>
+      <p:nvGrpSpPr>
+        <p:cNvPr id="1" name=""/>
+        <p:cNvGrpSpPr/>
+        <p:nvPr/>
+      </p:nvGrpSpPr>
+      <p:grpSpPr>
+        <a:xfrm>
+          <a:off x="0" y="0"/>
+          <a:ext cx="0" cy="0"/>
+          <a:chOff x="0" y="0"/>
+          <a:chExt cx="0" cy="0"/>
+        </a:xfrm>
+      </p:grpSpPr>
+      <p:sp>
+        <p:nvSpPr>
+          <p:cNvPr id="2" name="Folienbildplatzhalter 1"/>
+          <p:cNvSpPr>
+            <a:spLocks noGrp="1" noRot="1" noChangeAspect="1"/>
+          </p:cNvSpPr>
+          <p:nvPr>
+            <p:ph type="sldImg"/>
+          </p:nvPr>
+        </p:nvSpPr>
+        <p:spPr/>
+      </p:sp>
+      <p:sp>
+        <p:nvSpPr>
+          <p:cNvPr id="3" name="Notizenplatzhalter 2"/>
+          <p:cNvSpPr>
+            <a:spLocks noGrp="1"/>
+          </p:cNvSpPr>
+          <p:nvPr>
+            <p:ph type="body" idx="1"/>
+          </p:nvPr>
+        </p:nvSpPr>
+        <p:spPr/>
+        <p:txBody>
+          <a:bodyPr/>
+          <a:lstStyle/>
+          <a:p>
+            <a:r>
+              <a:rPr lang="de-DE" dirty="0"/>
+              <a:t>Hier habe ich mal gezeigt, wie die Umwandlung gemeint ist</a:t>
+            </a:r>
+          </a:p>
+        </p:txBody>
+      </p:sp>
+      <p:sp>
+        <p:nvSpPr>
+          <p:cNvPr id="4" name="Foliennummernplatzhalter 3"/>
+          <p:cNvSpPr>
+            <a:spLocks noGrp="1"/>
+          </p:cNvSpPr>
+          <p:nvPr>
+            <p:ph type="sldNum" sz="quarter" idx="5"/>
+          </p:nvPr>
+        </p:nvSpPr>
+        <p:spPr/>
+        <p:txBody>
+          <a:bodyPr/>
+          <a:lstStyle/>
+          <a:p>
+            <a:fld id="{D15B9CCF-FFA2-46F4-AE87-49E1E1368883}" type="slidenum">
+              <a:rPr lang="de-DE" smtClean="0"/>
+              <a:t>25</a:t>
+            </a:fld>
+            <a:endParaRPr lang="de-DE"/>
+          </a:p>
+        </p:txBody>
+      </p:sp>
+    </p:spTree>
+    <p:extLst>
+      <p:ext uri="{BB962C8B-B14F-4D97-AF65-F5344CB8AC3E}">
+        <p14:creationId xmlns:p14="http://schemas.microsoft.com/office/powerpoint/2010/main" val="957108521"/>
       </p:ext>
     </p:extLst>
   </p:cSld>
@@ -3931,7 +4059,7 @@
           <a:noFill/>
           <a:extLst>
             <a:ext uri="{909E8E84-426E-40dd-AFC4-6F175D3DCCD1}">
-              <a14:hiddenFill xmlns:a14="http://schemas.microsoft.com/office/drawing/2010/main" xmlns="">
+              <a14:hiddenFill xmlns="" xmlns:a14="http://schemas.microsoft.com/office/drawing/2010/main">
                 <a:solidFill>
                   <a:srgbClr val="FFFFFF"/>
                 </a:solidFill>
@@ -3991,7 +4119,7 @@
             </a:ln>
             <a:extLst>
               <a:ext uri="{91240B29-F687-4f45-9708-019B960494DF}">
-                <a14:hiddenLine xmlns:a14="http://schemas.microsoft.com/office/drawing/2010/main" xmlns="" w="9525">
+                <a14:hiddenLine xmlns="" xmlns:a14="http://schemas.microsoft.com/office/drawing/2010/main" w="9525">
                   <a:solidFill>
                     <a:srgbClr val="000000"/>
                   </a:solidFill>
@@ -4081,7 +4209,7 @@
             </a:ln>
             <a:extLst>
               <a:ext uri="{91240B29-F687-4f45-9708-019B960494DF}">
-                <a14:hiddenLine xmlns:a14="http://schemas.microsoft.com/office/drawing/2010/main" xmlns="" w="9525">
+                <a14:hiddenLine xmlns="" xmlns:a14="http://schemas.microsoft.com/office/drawing/2010/main" w="9525">
                   <a:solidFill>
                     <a:srgbClr val="000000"/>
                   </a:solidFill>
@@ -4171,7 +4299,7 @@
             </a:ln>
             <a:extLst>
               <a:ext uri="{91240B29-F687-4f45-9708-019B960494DF}">
-                <a14:hiddenLine xmlns:a14="http://schemas.microsoft.com/office/drawing/2010/main" xmlns="" w="9525">
+                <a14:hiddenLine xmlns="" xmlns:a14="http://schemas.microsoft.com/office/drawing/2010/main" w="9525">
                   <a:solidFill>
                     <a:srgbClr val="000000"/>
                   </a:solidFill>
@@ -4205,7 +4333,7 @@
             </a:ln>
             <a:extLst>
               <a:ext uri="{91240B29-F687-4f45-9708-019B960494DF}">
-                <a14:hiddenLine xmlns:a14="http://schemas.microsoft.com/office/drawing/2010/main" xmlns="" w="9525">
+                <a14:hiddenLine xmlns="" xmlns:a14="http://schemas.microsoft.com/office/drawing/2010/main" w="9525">
                   <a:solidFill>
                     <a:srgbClr val="000000"/>
                   </a:solidFill>
@@ -4295,7 +4423,7 @@
             </a:ln>
             <a:extLst>
               <a:ext uri="{91240B29-F687-4f45-9708-019B960494DF}">
-                <a14:hiddenLine xmlns:a14="http://schemas.microsoft.com/office/drawing/2010/main" xmlns="" w="9525">
+                <a14:hiddenLine xmlns="" xmlns:a14="http://schemas.microsoft.com/office/drawing/2010/main" w="9525">
                   <a:solidFill>
                     <a:srgbClr val="000000"/>
                   </a:solidFill>
@@ -4357,7 +4485,7 @@
             </a:ln>
             <a:extLst>
               <a:ext uri="{91240B29-F687-4f45-9708-019B960494DF}">
-                <a14:hiddenLine xmlns:a14="http://schemas.microsoft.com/office/drawing/2010/main" xmlns="" w="9525">
+                <a14:hiddenLine xmlns="" xmlns:a14="http://schemas.microsoft.com/office/drawing/2010/main" w="9525">
                   <a:solidFill>
                     <a:srgbClr val="000000"/>
                   </a:solidFill>
@@ -4419,7 +4547,7 @@
             </a:ln>
             <a:extLst>
               <a:ext uri="{91240B29-F687-4f45-9708-019B960494DF}">
-                <a14:hiddenLine xmlns:a14="http://schemas.microsoft.com/office/drawing/2010/main" xmlns="" w="9525">
+                <a14:hiddenLine xmlns="" xmlns:a14="http://schemas.microsoft.com/office/drawing/2010/main" w="9525">
                   <a:solidFill>
                     <a:srgbClr val="000000"/>
                   </a:solidFill>
@@ -4509,7 +4637,7 @@
             </a:ln>
             <a:extLst>
               <a:ext uri="{91240B29-F687-4f45-9708-019B960494DF}">
-                <a14:hiddenLine xmlns:a14="http://schemas.microsoft.com/office/drawing/2010/main" xmlns="" w="9525">
+                <a14:hiddenLine xmlns="" xmlns:a14="http://schemas.microsoft.com/office/drawing/2010/main" w="9525">
                   <a:solidFill>
                     <a:srgbClr val="000000"/>
                   </a:solidFill>
@@ -4571,7 +4699,7 @@
             </a:ln>
             <a:extLst>
               <a:ext uri="{91240B29-F687-4f45-9708-019B960494DF}">
-                <a14:hiddenLine xmlns:a14="http://schemas.microsoft.com/office/drawing/2010/main" xmlns="" w="9525">
+                <a14:hiddenLine xmlns="" xmlns:a14="http://schemas.microsoft.com/office/drawing/2010/main" w="9525">
                   <a:solidFill>
                     <a:srgbClr val="000000"/>
                   </a:solidFill>
@@ -4633,7 +4761,7 @@
             </a:ln>
             <a:extLst>
               <a:ext uri="{91240B29-F687-4f45-9708-019B960494DF}">
-                <a14:hiddenLine xmlns:a14="http://schemas.microsoft.com/office/drawing/2010/main" xmlns="" w="9525">
+                <a14:hiddenLine xmlns="" xmlns:a14="http://schemas.microsoft.com/office/drawing/2010/main" w="9525">
                   <a:solidFill>
                     <a:srgbClr val="000000"/>
                   </a:solidFill>
@@ -4723,7 +4851,7 @@
             </a:ln>
             <a:extLst>
               <a:ext uri="{91240B29-F687-4f45-9708-019B960494DF}">
-                <a14:hiddenLine xmlns:a14="http://schemas.microsoft.com/office/drawing/2010/main" xmlns="" w="9525">
+                <a14:hiddenLine xmlns="" xmlns:a14="http://schemas.microsoft.com/office/drawing/2010/main" w="9525">
                   <a:solidFill>
                     <a:srgbClr val="000000"/>
                   </a:solidFill>
@@ -4813,7 +4941,7 @@
             </a:ln>
             <a:extLst>
               <a:ext uri="{91240B29-F687-4f45-9708-019B960494DF}">
-                <a14:hiddenLine xmlns:a14="http://schemas.microsoft.com/office/drawing/2010/main" xmlns="" w="9525">
+                <a14:hiddenLine xmlns="" xmlns:a14="http://schemas.microsoft.com/office/drawing/2010/main" w="9525">
                   <a:solidFill>
                     <a:srgbClr val="000000"/>
                   </a:solidFill>
@@ -4875,7 +5003,7 @@
             </a:ln>
             <a:extLst>
               <a:ext uri="{91240B29-F687-4f45-9708-019B960494DF}">
-                <a14:hiddenLine xmlns:a14="http://schemas.microsoft.com/office/drawing/2010/main" xmlns="" w="9525">
+                <a14:hiddenLine xmlns="" xmlns:a14="http://schemas.microsoft.com/office/drawing/2010/main" w="9525">
                   <a:solidFill>
                     <a:srgbClr val="000000"/>
                   </a:solidFill>
@@ -4985,7 +5113,7 @@
             </a:ln>
             <a:extLst>
               <a:ext uri="{91240B29-F687-4f45-9708-019B960494DF}">
-                <a14:hiddenLine xmlns:a14="http://schemas.microsoft.com/office/drawing/2010/main" xmlns="" w="9525">
+                <a14:hiddenLine xmlns="" xmlns:a14="http://schemas.microsoft.com/office/drawing/2010/main" w="9525">
                   <a:solidFill>
                     <a:srgbClr val="000000"/>
                   </a:solidFill>
@@ -5047,7 +5175,7 @@
             </a:ln>
             <a:extLst>
               <a:ext uri="{91240B29-F687-4f45-9708-019B960494DF}">
-                <a14:hiddenLine xmlns:a14="http://schemas.microsoft.com/office/drawing/2010/main" xmlns="" w="9525">
+                <a14:hiddenLine xmlns="" xmlns:a14="http://schemas.microsoft.com/office/drawing/2010/main" w="9525">
                   <a:solidFill>
                     <a:srgbClr val="000000"/>
                   </a:solidFill>
@@ -5137,7 +5265,7 @@
             </a:ln>
             <a:extLst>
               <a:ext uri="{91240B29-F687-4f45-9708-019B960494DF}">
-                <a14:hiddenLine xmlns:a14="http://schemas.microsoft.com/office/drawing/2010/main" xmlns="" w="9525">
+                <a14:hiddenLine xmlns="" xmlns:a14="http://schemas.microsoft.com/office/drawing/2010/main" w="9525">
                   <a:solidFill>
                     <a:srgbClr val="000000"/>
                   </a:solidFill>
@@ -5227,7 +5355,7 @@
             </a:ln>
             <a:extLst>
               <a:ext uri="{91240B29-F687-4f45-9708-019B960494DF}">
-                <a14:hiddenLine xmlns:a14="http://schemas.microsoft.com/office/drawing/2010/main" xmlns="" w="9525">
+                <a14:hiddenLine xmlns="" xmlns:a14="http://schemas.microsoft.com/office/drawing/2010/main" w="9525">
                   <a:solidFill>
                     <a:srgbClr val="000000"/>
                   </a:solidFill>
@@ -5289,7 +5417,7 @@
             </a:ln>
             <a:extLst>
               <a:ext uri="{91240B29-F687-4f45-9708-019B960494DF}">
-                <a14:hiddenLine xmlns:a14="http://schemas.microsoft.com/office/drawing/2010/main" xmlns="" w="9525">
+                <a14:hiddenLine xmlns="" xmlns:a14="http://schemas.microsoft.com/office/drawing/2010/main" w="9525">
                   <a:solidFill>
                     <a:srgbClr val="000000"/>
                   </a:solidFill>
@@ -5379,7 +5507,7 @@
             </a:ln>
             <a:extLst>
               <a:ext uri="{91240B29-F687-4f45-9708-019B960494DF}">
-                <a14:hiddenLine xmlns:a14="http://schemas.microsoft.com/office/drawing/2010/main" xmlns="" w="9525">
+                <a14:hiddenLine xmlns="" xmlns:a14="http://schemas.microsoft.com/office/drawing/2010/main" w="9525">
                   <a:solidFill>
                     <a:srgbClr val="000000"/>
                   </a:solidFill>
@@ -5469,7 +5597,7 @@
             </a:ln>
             <a:extLst>
               <a:ext uri="{91240B29-F687-4f45-9708-019B960494DF}">
-                <a14:hiddenLine xmlns:a14="http://schemas.microsoft.com/office/drawing/2010/main" xmlns="" w="9525">
+                <a14:hiddenLine xmlns="" xmlns:a14="http://schemas.microsoft.com/office/drawing/2010/main" w="9525">
                   <a:solidFill>
                     <a:srgbClr val="000000"/>
                   </a:solidFill>
@@ -5525,7 +5653,7 @@
             </a:ln>
             <a:extLst>
               <a:ext uri="{91240B29-F687-4f45-9708-019B960494DF}">
-                <a14:hiddenLine xmlns:a14="http://schemas.microsoft.com/office/drawing/2010/main" xmlns="" w="9525">
+                <a14:hiddenLine xmlns="" xmlns:a14="http://schemas.microsoft.com/office/drawing/2010/main" w="9525">
                   <a:solidFill>
                     <a:srgbClr val="000000"/>
                   </a:solidFill>
@@ -5615,7 +5743,7 @@
             </a:ln>
             <a:extLst>
               <a:ext uri="{91240B29-F687-4f45-9708-019B960494DF}">
-                <a14:hiddenLine xmlns:a14="http://schemas.microsoft.com/office/drawing/2010/main" xmlns="" w="9525">
+                <a14:hiddenLine xmlns="" xmlns:a14="http://schemas.microsoft.com/office/drawing/2010/main" w="9525">
                   <a:solidFill>
                     <a:srgbClr val="000000"/>
                   </a:solidFill>
@@ -5671,7 +5799,7 @@
             </a:ln>
             <a:extLst>
               <a:ext uri="{91240B29-F687-4f45-9708-019B960494DF}">
-                <a14:hiddenLine xmlns:a14="http://schemas.microsoft.com/office/drawing/2010/main" xmlns="" w="9525">
+                <a14:hiddenLine xmlns="" xmlns:a14="http://schemas.microsoft.com/office/drawing/2010/main" w="9525">
                   <a:solidFill>
                     <a:srgbClr val="000000"/>
                   </a:solidFill>
@@ -5761,7 +5889,7 @@
             </a:ln>
             <a:extLst>
               <a:ext uri="{91240B29-F687-4f45-9708-019B960494DF}">
-                <a14:hiddenLine xmlns:a14="http://schemas.microsoft.com/office/drawing/2010/main" xmlns="" w="9525">
+                <a14:hiddenLine xmlns="" xmlns:a14="http://schemas.microsoft.com/office/drawing/2010/main" w="9525">
                   <a:solidFill>
                     <a:srgbClr val="000000"/>
                   </a:solidFill>
@@ -5829,7 +5957,7 @@
             </a:ln>
             <a:extLst>
               <a:ext uri="{91240B29-F687-4f45-9708-019B960494DF}">
-                <a14:hiddenLine xmlns:a14="http://schemas.microsoft.com/office/drawing/2010/main" xmlns="" w="9525">
+                <a14:hiddenLine xmlns="" xmlns:a14="http://schemas.microsoft.com/office/drawing/2010/main" w="9525">
                   <a:solidFill>
                     <a:srgbClr val="000000"/>
                   </a:solidFill>
@@ -5919,7 +6047,7 @@
             </a:ln>
             <a:extLst>
               <a:ext uri="{91240B29-F687-4f45-9708-019B960494DF}">
-                <a14:hiddenLine xmlns:a14="http://schemas.microsoft.com/office/drawing/2010/main" xmlns="" w="9525">
+                <a14:hiddenLine xmlns="" xmlns:a14="http://schemas.microsoft.com/office/drawing/2010/main" w="9525">
                   <a:solidFill>
                     <a:srgbClr val="000000"/>
                   </a:solidFill>
@@ -5987,7 +6115,7 @@
             </a:ln>
             <a:extLst>
               <a:ext uri="{91240B29-F687-4f45-9708-019B960494DF}">
-                <a14:hiddenLine xmlns:a14="http://schemas.microsoft.com/office/drawing/2010/main" xmlns="" w="9525">
+                <a14:hiddenLine xmlns="" xmlns:a14="http://schemas.microsoft.com/office/drawing/2010/main" w="9525">
                   <a:solidFill>
                     <a:srgbClr val="000000"/>
                   </a:solidFill>
@@ -6077,7 +6205,7 @@
             </a:ln>
             <a:extLst>
               <a:ext uri="{91240B29-F687-4f45-9708-019B960494DF}">
-                <a14:hiddenLine xmlns:a14="http://schemas.microsoft.com/office/drawing/2010/main" xmlns="" w="9525">
+                <a14:hiddenLine xmlns="" xmlns:a14="http://schemas.microsoft.com/office/drawing/2010/main" w="9525">
                   <a:solidFill>
                     <a:srgbClr val="000000"/>
                   </a:solidFill>
@@ -6111,7 +6239,7 @@
             </a:ln>
             <a:extLst>
               <a:ext uri="{91240B29-F687-4f45-9708-019B960494DF}">
-                <a14:hiddenLine xmlns:a14="http://schemas.microsoft.com/office/drawing/2010/main" xmlns="" w="9525">
+                <a14:hiddenLine xmlns="" xmlns:a14="http://schemas.microsoft.com/office/drawing/2010/main" w="9525">
                   <a:solidFill>
                     <a:srgbClr val="000000"/>
                   </a:solidFill>
@@ -6201,7 +6329,7 @@
             </a:ln>
             <a:extLst>
               <a:ext uri="{91240B29-F687-4f45-9708-019B960494DF}">
-                <a14:hiddenLine xmlns:a14="http://schemas.microsoft.com/office/drawing/2010/main" xmlns="" w="9525">
+                <a14:hiddenLine xmlns="" xmlns:a14="http://schemas.microsoft.com/office/drawing/2010/main" w="9525">
                   <a:solidFill>
                     <a:srgbClr val="000000"/>
                   </a:solidFill>
@@ -6263,7 +6391,7 @@
             </a:ln>
             <a:extLst>
               <a:ext uri="{91240B29-F687-4f45-9708-019B960494DF}">
-                <a14:hiddenLine xmlns:a14="http://schemas.microsoft.com/office/drawing/2010/main" xmlns="" w="9525">
+                <a14:hiddenLine xmlns="" xmlns:a14="http://schemas.microsoft.com/office/drawing/2010/main" w="9525">
                   <a:solidFill>
                     <a:srgbClr val="000000"/>
                   </a:solidFill>
@@ -6325,7 +6453,7 @@
             </a:ln>
             <a:extLst>
               <a:ext uri="{91240B29-F687-4f45-9708-019B960494DF}">
-                <a14:hiddenLine xmlns:a14="http://schemas.microsoft.com/office/drawing/2010/main" xmlns="" w="9525">
+                <a14:hiddenLine xmlns="" xmlns:a14="http://schemas.microsoft.com/office/drawing/2010/main" w="9525">
                   <a:solidFill>
                     <a:srgbClr val="000000"/>
                   </a:solidFill>
@@ -6415,7 +6543,7 @@
             </a:ln>
             <a:extLst>
               <a:ext uri="{91240B29-F687-4f45-9708-019B960494DF}">
-                <a14:hiddenLine xmlns:a14="http://schemas.microsoft.com/office/drawing/2010/main" xmlns="" w="9525">
+                <a14:hiddenLine xmlns="" xmlns:a14="http://schemas.microsoft.com/office/drawing/2010/main" w="9525">
                   <a:solidFill>
                     <a:srgbClr val="000000"/>
                   </a:solidFill>
@@ -6483,7 +6611,7 @@
             </a:ln>
             <a:extLst>
               <a:ext uri="{91240B29-F687-4f45-9708-019B960494DF}">
-                <a14:hiddenLine xmlns:a14="http://schemas.microsoft.com/office/drawing/2010/main" xmlns="" w="9525">
+                <a14:hiddenLine xmlns="" xmlns:a14="http://schemas.microsoft.com/office/drawing/2010/main" w="9525">
                   <a:solidFill>
                     <a:srgbClr val="000000"/>
                   </a:solidFill>
@@ -6545,7 +6673,7 @@
             </a:ln>
             <a:extLst>
               <a:ext uri="{91240B29-F687-4f45-9708-019B960494DF}">
-                <a14:hiddenLine xmlns:a14="http://schemas.microsoft.com/office/drawing/2010/main" xmlns="" w="9525">
+                <a14:hiddenLine xmlns="" xmlns:a14="http://schemas.microsoft.com/office/drawing/2010/main" w="9525">
                   <a:solidFill>
                     <a:srgbClr val="000000"/>
                   </a:solidFill>
@@ -6635,7 +6763,7 @@
             </a:ln>
             <a:extLst>
               <a:ext uri="{91240B29-F687-4f45-9708-019B960494DF}">
-                <a14:hiddenLine xmlns:a14="http://schemas.microsoft.com/office/drawing/2010/main" xmlns="" w="9525">
+                <a14:hiddenLine xmlns="" xmlns:a14="http://schemas.microsoft.com/office/drawing/2010/main" w="9525">
                   <a:solidFill>
                     <a:srgbClr val="000000"/>
                   </a:solidFill>
@@ -6697,7 +6825,7 @@
             </a:ln>
             <a:extLst>
               <a:ext uri="{91240B29-F687-4f45-9708-019B960494DF}">
-                <a14:hiddenLine xmlns:a14="http://schemas.microsoft.com/office/drawing/2010/main" xmlns="" w="9525">
+                <a14:hiddenLine xmlns="" xmlns:a14="http://schemas.microsoft.com/office/drawing/2010/main" w="9525">
                   <a:solidFill>
                     <a:srgbClr val="000000"/>
                   </a:solidFill>
@@ -6787,7 +6915,7 @@
             </a:ln>
             <a:extLst>
               <a:ext uri="{91240B29-F687-4f45-9708-019B960494DF}">
-                <a14:hiddenLine xmlns:a14="http://schemas.microsoft.com/office/drawing/2010/main" xmlns="" w="9525">
+                <a14:hiddenLine xmlns="" xmlns:a14="http://schemas.microsoft.com/office/drawing/2010/main" w="9525">
                   <a:solidFill>
                     <a:srgbClr val="000000"/>
                   </a:solidFill>
@@ -6849,7 +6977,7 @@
             </a:ln>
             <a:extLst>
               <a:ext uri="{91240B29-F687-4f45-9708-019B960494DF}">
-                <a14:hiddenLine xmlns:a14="http://schemas.microsoft.com/office/drawing/2010/main" xmlns="" w="9525">
+                <a14:hiddenLine xmlns="" xmlns:a14="http://schemas.microsoft.com/office/drawing/2010/main" w="9525">
                   <a:solidFill>
                     <a:srgbClr val="000000"/>
                   </a:solidFill>
@@ -6939,7 +7067,7 @@
             </a:ln>
             <a:extLst>
               <a:ext uri="{91240B29-F687-4f45-9708-019B960494DF}">
-                <a14:hiddenLine xmlns:a14="http://schemas.microsoft.com/office/drawing/2010/main" xmlns="" w="9525">
+                <a14:hiddenLine xmlns="" xmlns:a14="http://schemas.microsoft.com/office/drawing/2010/main" w="9525">
                   <a:solidFill>
                     <a:srgbClr val="000000"/>
                   </a:solidFill>
@@ -6973,7 +7101,7 @@
             </a:ln>
             <a:extLst>
               <a:ext uri="{91240B29-F687-4f45-9708-019B960494DF}">
-                <a14:hiddenLine xmlns:a14="http://schemas.microsoft.com/office/drawing/2010/main" xmlns="" w="9525">
+                <a14:hiddenLine xmlns="" xmlns:a14="http://schemas.microsoft.com/office/drawing/2010/main" w="9525">
                   <a:solidFill>
                     <a:srgbClr val="000000"/>
                   </a:solidFill>
@@ -7038,7 +7166,7 @@
             </a:ln>
             <a:extLst>
               <a:ext uri="{91240B29-F687-4f45-9708-019B960494DF}">
-                <a14:hiddenLine xmlns:a14="http://schemas.microsoft.com/office/drawing/2010/main" xmlns="" w="9525">
+                <a14:hiddenLine xmlns="" xmlns:a14="http://schemas.microsoft.com/office/drawing/2010/main" w="9525">
                   <a:solidFill>
                     <a:srgbClr val="000000"/>
                   </a:solidFill>
@@ -7128,7 +7256,7 @@
             </a:ln>
             <a:extLst>
               <a:ext uri="{91240B29-F687-4f45-9708-019B960494DF}">
-                <a14:hiddenLine xmlns:a14="http://schemas.microsoft.com/office/drawing/2010/main" xmlns="" w="9525">
+                <a14:hiddenLine xmlns="" xmlns:a14="http://schemas.microsoft.com/office/drawing/2010/main" w="9525">
                   <a:solidFill>
                     <a:srgbClr val="000000"/>
                   </a:solidFill>
@@ -7190,7 +7318,7 @@
             </a:ln>
             <a:extLst>
               <a:ext uri="{91240B29-F687-4f45-9708-019B960494DF}">
-                <a14:hiddenLine xmlns:a14="http://schemas.microsoft.com/office/drawing/2010/main" xmlns="" w="9525">
+                <a14:hiddenLine xmlns="" xmlns:a14="http://schemas.microsoft.com/office/drawing/2010/main" w="9525">
                   <a:solidFill>
                     <a:srgbClr val="000000"/>
                   </a:solidFill>
@@ -7280,7 +7408,7 @@
             </a:ln>
             <a:extLst>
               <a:ext uri="{91240B29-F687-4f45-9708-019B960494DF}">
-                <a14:hiddenLine xmlns:a14="http://schemas.microsoft.com/office/drawing/2010/main" xmlns="" w="9525">
+                <a14:hiddenLine xmlns="" xmlns:a14="http://schemas.microsoft.com/office/drawing/2010/main" w="9525">
                   <a:solidFill>
                     <a:srgbClr val="000000"/>
                   </a:solidFill>
@@ -7370,7 +7498,7 @@
             </a:ln>
             <a:extLst>
               <a:ext uri="{91240B29-F687-4f45-9708-019B960494DF}">
-                <a14:hiddenLine xmlns:a14="http://schemas.microsoft.com/office/drawing/2010/main" xmlns="" w="9525">
+                <a14:hiddenLine xmlns="" xmlns:a14="http://schemas.microsoft.com/office/drawing/2010/main" w="9525">
                   <a:solidFill>
                     <a:srgbClr val="000000"/>
                   </a:solidFill>
@@ -7435,7 +7563,7 @@
             </a:ln>
             <a:extLst>
               <a:ext uri="{91240B29-F687-4f45-9708-019B960494DF}">
-                <a14:hiddenLine xmlns:a14="http://schemas.microsoft.com/office/drawing/2010/main" xmlns="" w="9525">
+                <a14:hiddenLine xmlns="" xmlns:a14="http://schemas.microsoft.com/office/drawing/2010/main" w="9525">
                   <a:solidFill>
                     <a:srgbClr val="000000"/>
                   </a:solidFill>
@@ -7497,7 +7625,7 @@
             </a:ln>
             <a:extLst>
               <a:ext uri="{91240B29-F687-4f45-9708-019B960494DF}">
-                <a14:hiddenLine xmlns:a14="http://schemas.microsoft.com/office/drawing/2010/main" xmlns="" w="9525">
+                <a14:hiddenLine xmlns="" xmlns:a14="http://schemas.microsoft.com/office/drawing/2010/main" w="9525">
                   <a:solidFill>
                     <a:srgbClr val="000000"/>
                   </a:solidFill>
@@ -7587,7 +7715,7 @@
             </a:ln>
             <a:extLst>
               <a:ext uri="{91240B29-F687-4f45-9708-019B960494DF}">
-                <a14:hiddenLine xmlns:a14="http://schemas.microsoft.com/office/drawing/2010/main" xmlns="" w="9525">
+                <a14:hiddenLine xmlns="" xmlns:a14="http://schemas.microsoft.com/office/drawing/2010/main" w="9525">
                   <a:solidFill>
                     <a:srgbClr val="000000"/>
                   </a:solidFill>
@@ -7677,7 +7805,7 @@
             </a:ln>
             <a:extLst>
               <a:ext uri="{91240B29-F687-4f45-9708-019B960494DF}">
-                <a14:hiddenLine xmlns:a14="http://schemas.microsoft.com/office/drawing/2010/main" xmlns="" w="9525">
+                <a14:hiddenLine xmlns="" xmlns:a14="http://schemas.microsoft.com/office/drawing/2010/main" w="9525">
                   <a:solidFill>
                     <a:srgbClr val="000000"/>
                   </a:solidFill>
@@ -7739,7 +7867,7 @@
             </a:ln>
             <a:extLst>
               <a:ext uri="{91240B29-F687-4f45-9708-019B960494DF}">
-                <a14:hiddenLine xmlns:a14="http://schemas.microsoft.com/office/drawing/2010/main" xmlns="" w="9525">
+                <a14:hiddenLine xmlns="" xmlns:a14="http://schemas.microsoft.com/office/drawing/2010/main" w="9525">
                   <a:solidFill>
                     <a:srgbClr val="000000"/>
                   </a:solidFill>
@@ -7859,7 +7987,7 @@
             </a:ln>
             <a:extLst>
               <a:ext uri="{91240B29-F687-4f45-9708-019B960494DF}">
-                <a14:hiddenLine xmlns:a14="http://schemas.microsoft.com/office/drawing/2010/main" xmlns="" w="9525">
+                <a14:hiddenLine xmlns="" xmlns:a14="http://schemas.microsoft.com/office/drawing/2010/main" w="9525">
                   <a:solidFill>
                     <a:srgbClr val="000000"/>
                   </a:solidFill>
@@ -7927,7 +8055,7 @@
             </a:ln>
             <a:extLst>
               <a:ext uri="{91240B29-F687-4f45-9708-019B960494DF}">
-                <a14:hiddenLine xmlns:a14="http://schemas.microsoft.com/office/drawing/2010/main" xmlns="" w="9525">
+                <a14:hiddenLine xmlns="" xmlns:a14="http://schemas.microsoft.com/office/drawing/2010/main" w="9525">
                   <a:solidFill>
                     <a:srgbClr val="000000"/>
                   </a:solidFill>
@@ -8017,7 +8145,7 @@
             </a:ln>
             <a:extLst>
               <a:ext uri="{91240B29-F687-4f45-9708-019B960494DF}">
-                <a14:hiddenLine xmlns:a14="http://schemas.microsoft.com/office/drawing/2010/main" xmlns="" w="9525">
+                <a14:hiddenLine xmlns="" xmlns:a14="http://schemas.microsoft.com/office/drawing/2010/main" w="9525">
                   <a:solidFill>
                     <a:srgbClr val="000000"/>
                   </a:solidFill>
@@ -12739,7 +12867,7 @@
           <a:noFill/>
           <a:extLst>
             <a:ext uri="{909E8E84-426E-40dd-AFC4-6F175D3DCCD1}">
-              <a14:hiddenFill xmlns:a14="http://schemas.microsoft.com/office/drawing/2010/main" xmlns="">
+              <a14:hiddenFill xmlns="" xmlns:a14="http://schemas.microsoft.com/office/drawing/2010/main">
                 <a:solidFill>
                   <a:srgbClr val="FFFFFF"/>
                 </a:solidFill>
@@ -12813,7 +12941,7 @@
               </a:ln>
               <a:extLst>
                 <a:ext uri="{91240B29-F687-4f45-9708-019B960494DF}">
-                  <a14:hiddenLine xmlns:a14="http://schemas.microsoft.com/office/drawing/2010/main" xmlns="" w="9525">
+                  <a14:hiddenLine xmlns="" xmlns:a14="http://schemas.microsoft.com/office/drawing/2010/main" w="9525">
                     <a:solidFill>
                       <a:srgbClr val="000000"/>
                     </a:solidFill>
@@ -12903,7 +13031,7 @@
               </a:ln>
               <a:extLst>
                 <a:ext uri="{91240B29-F687-4f45-9708-019B960494DF}">
-                  <a14:hiddenLine xmlns:a14="http://schemas.microsoft.com/office/drawing/2010/main" xmlns="" w="9525">
+                  <a14:hiddenLine xmlns="" xmlns:a14="http://schemas.microsoft.com/office/drawing/2010/main" w="9525">
                     <a:solidFill>
                       <a:srgbClr val="000000"/>
                     </a:solidFill>
@@ -12993,7 +13121,7 @@
               </a:ln>
               <a:extLst>
                 <a:ext uri="{91240B29-F687-4f45-9708-019B960494DF}">
-                  <a14:hiddenLine xmlns:a14="http://schemas.microsoft.com/office/drawing/2010/main" xmlns="" w="9525">
+                  <a14:hiddenLine xmlns="" xmlns:a14="http://schemas.microsoft.com/office/drawing/2010/main" w="9525">
                     <a:solidFill>
                       <a:srgbClr val="000000"/>
                     </a:solidFill>
@@ -13055,7 +13183,7 @@
               </a:ln>
               <a:extLst>
                 <a:ext uri="{91240B29-F687-4f45-9708-019B960494DF}">
-                  <a14:hiddenLine xmlns:a14="http://schemas.microsoft.com/office/drawing/2010/main" xmlns="" w="9525">
+                  <a14:hiddenLine xmlns="" xmlns:a14="http://schemas.microsoft.com/office/drawing/2010/main" w="9525">
                     <a:solidFill>
                       <a:srgbClr val="000000"/>
                     </a:solidFill>
@@ -13145,7 +13273,7 @@
               </a:ln>
               <a:extLst>
                 <a:ext uri="{91240B29-F687-4f45-9708-019B960494DF}">
-                  <a14:hiddenLine xmlns:a14="http://schemas.microsoft.com/office/drawing/2010/main" xmlns="" w="9525">
+                  <a14:hiddenLine xmlns="" xmlns:a14="http://schemas.microsoft.com/office/drawing/2010/main" w="9525">
                     <a:solidFill>
                       <a:srgbClr val="000000"/>
                     </a:solidFill>
@@ -13207,7 +13335,7 @@
               </a:ln>
               <a:extLst>
                 <a:ext uri="{91240B29-F687-4f45-9708-019B960494DF}">
-                  <a14:hiddenLine xmlns:a14="http://schemas.microsoft.com/office/drawing/2010/main" xmlns="" w="9525">
+                  <a14:hiddenLine xmlns="" xmlns:a14="http://schemas.microsoft.com/office/drawing/2010/main" w="9525">
                     <a:solidFill>
                       <a:srgbClr val="000000"/>
                     </a:solidFill>
@@ -13269,7 +13397,7 @@
               </a:ln>
               <a:extLst>
                 <a:ext uri="{91240B29-F687-4f45-9708-019B960494DF}">
-                  <a14:hiddenLine xmlns:a14="http://schemas.microsoft.com/office/drawing/2010/main" xmlns="" w="9525">
+                  <a14:hiddenLine xmlns="" xmlns:a14="http://schemas.microsoft.com/office/drawing/2010/main" w="9525">
                     <a:solidFill>
                       <a:srgbClr val="000000"/>
                     </a:solidFill>
@@ -13359,7 +13487,7 @@
               </a:ln>
               <a:extLst>
                 <a:ext uri="{91240B29-F687-4f45-9708-019B960494DF}">
-                  <a14:hiddenLine xmlns:a14="http://schemas.microsoft.com/office/drawing/2010/main" xmlns="" w="9525">
+                  <a14:hiddenLine xmlns="" xmlns:a14="http://schemas.microsoft.com/office/drawing/2010/main" w="9525">
                     <a:solidFill>
                       <a:srgbClr val="000000"/>
                     </a:solidFill>
@@ -13449,7 +13577,7 @@
               </a:ln>
               <a:extLst>
                 <a:ext uri="{91240B29-F687-4f45-9708-019B960494DF}">
-                  <a14:hiddenLine xmlns:a14="http://schemas.microsoft.com/office/drawing/2010/main" xmlns="" w="9525">
+                  <a14:hiddenLine xmlns="" xmlns:a14="http://schemas.microsoft.com/office/drawing/2010/main" w="9525">
                     <a:solidFill>
                       <a:srgbClr val="000000"/>
                     </a:solidFill>
@@ -13511,7 +13639,7 @@
               </a:ln>
               <a:extLst>
                 <a:ext uri="{91240B29-F687-4f45-9708-019B960494DF}">
-                  <a14:hiddenLine xmlns:a14="http://schemas.microsoft.com/office/drawing/2010/main" xmlns="" w="9525">
+                  <a14:hiddenLine xmlns="" xmlns:a14="http://schemas.microsoft.com/office/drawing/2010/main" w="9525">
                     <a:solidFill>
                       <a:srgbClr val="000000"/>
                     </a:solidFill>
@@ -13621,7 +13749,7 @@
               </a:ln>
               <a:extLst>
                 <a:ext uri="{91240B29-F687-4f45-9708-019B960494DF}">
-                  <a14:hiddenLine xmlns:a14="http://schemas.microsoft.com/office/drawing/2010/main" xmlns="" w="9525">
+                  <a14:hiddenLine xmlns="" xmlns:a14="http://schemas.microsoft.com/office/drawing/2010/main" w="9525">
                     <a:solidFill>
                       <a:srgbClr val="000000"/>
                     </a:solidFill>
@@ -13705,7 +13833,7 @@
               </a:ln>
               <a:extLst>
                 <a:ext uri="{91240B29-F687-4f45-9708-019B960494DF}">
-                  <a14:hiddenLine xmlns:a14="http://schemas.microsoft.com/office/drawing/2010/main" xmlns="" w="9525">
+                  <a14:hiddenLine xmlns="" xmlns:a14="http://schemas.microsoft.com/office/drawing/2010/main" w="9525">
                     <a:solidFill>
                       <a:srgbClr val="000000"/>
                     </a:solidFill>
@@ -13767,7 +13895,7 @@
               </a:ln>
               <a:extLst>
                 <a:ext uri="{91240B29-F687-4f45-9708-019B960494DF}">
-                  <a14:hiddenLine xmlns:a14="http://schemas.microsoft.com/office/drawing/2010/main" xmlns="" w="9525">
+                  <a14:hiddenLine xmlns="" xmlns:a14="http://schemas.microsoft.com/office/drawing/2010/main" w="9525">
                     <a:solidFill>
                       <a:srgbClr val="000000"/>
                     </a:solidFill>
@@ -13829,7 +13957,7 @@
               </a:ln>
               <a:extLst>
                 <a:ext uri="{91240B29-F687-4f45-9708-019B960494DF}">
-                  <a14:hiddenLine xmlns:a14="http://schemas.microsoft.com/office/drawing/2010/main" xmlns="" w="9525">
+                  <a14:hiddenLine xmlns="" xmlns:a14="http://schemas.microsoft.com/office/drawing/2010/main" w="9525">
                     <a:solidFill>
                       <a:srgbClr val="000000"/>
                     </a:solidFill>
@@ -13919,7 +14047,7 @@
               </a:ln>
               <a:extLst>
                 <a:ext uri="{91240B29-F687-4f45-9708-019B960494DF}">
-                  <a14:hiddenLine xmlns:a14="http://schemas.microsoft.com/office/drawing/2010/main" xmlns="" w="9525">
+                  <a14:hiddenLine xmlns="" xmlns:a14="http://schemas.microsoft.com/office/drawing/2010/main" w="9525">
                     <a:solidFill>
                       <a:srgbClr val="000000"/>
                     </a:solidFill>
@@ -13953,7 +14081,7 @@
               </a:ln>
               <a:extLst>
                 <a:ext uri="{91240B29-F687-4f45-9708-019B960494DF}">
-                  <a14:hiddenLine xmlns:a14="http://schemas.microsoft.com/office/drawing/2010/main" xmlns="" w="9525">
+                  <a14:hiddenLine xmlns="" xmlns:a14="http://schemas.microsoft.com/office/drawing/2010/main" w="9525">
                     <a:solidFill>
                       <a:srgbClr val="000000"/>
                     </a:solidFill>
@@ -14018,7 +14146,7 @@
               </a:ln>
               <a:extLst>
                 <a:ext uri="{91240B29-F687-4f45-9708-019B960494DF}">
-                  <a14:hiddenLine xmlns:a14="http://schemas.microsoft.com/office/drawing/2010/main" xmlns="" w="9525">
+                  <a14:hiddenLine xmlns="" xmlns:a14="http://schemas.microsoft.com/office/drawing/2010/main" w="9525">
                     <a:solidFill>
                       <a:srgbClr val="000000"/>
                     </a:solidFill>
@@ -14108,7 +14236,7 @@
               </a:ln>
               <a:extLst>
                 <a:ext uri="{91240B29-F687-4f45-9708-019B960494DF}">
-                  <a14:hiddenLine xmlns:a14="http://schemas.microsoft.com/office/drawing/2010/main" xmlns="" w="9525">
+                  <a14:hiddenLine xmlns="" xmlns:a14="http://schemas.microsoft.com/office/drawing/2010/main" w="9525">
                     <a:solidFill>
                       <a:srgbClr val="000000"/>
                     </a:solidFill>
@@ -14170,7 +14298,7 @@
               </a:ln>
               <a:extLst>
                 <a:ext uri="{91240B29-F687-4f45-9708-019B960494DF}">
-                  <a14:hiddenLine xmlns:a14="http://schemas.microsoft.com/office/drawing/2010/main" xmlns="" w="9525">
+                  <a14:hiddenLine xmlns="" xmlns:a14="http://schemas.microsoft.com/office/drawing/2010/main" w="9525">
                     <a:solidFill>
                       <a:srgbClr val="000000"/>
                     </a:solidFill>
@@ -14260,7 +14388,7 @@
               </a:ln>
               <a:extLst>
                 <a:ext uri="{91240B29-F687-4f45-9708-019B960494DF}">
-                  <a14:hiddenLine xmlns:a14="http://schemas.microsoft.com/office/drawing/2010/main" xmlns="" w="9525">
+                  <a14:hiddenLine xmlns="" xmlns:a14="http://schemas.microsoft.com/office/drawing/2010/main" w="9525">
                     <a:solidFill>
                       <a:srgbClr val="000000"/>
                     </a:solidFill>
@@ -14325,7 +14453,7 @@
               </a:ln>
               <a:extLst>
                 <a:ext uri="{91240B29-F687-4f45-9708-019B960494DF}">
-                  <a14:hiddenLine xmlns:a14="http://schemas.microsoft.com/office/drawing/2010/main" xmlns="" w="9525">
+                  <a14:hiddenLine xmlns="" xmlns:a14="http://schemas.microsoft.com/office/drawing/2010/main" w="9525">
                     <a:solidFill>
                       <a:srgbClr val="000000"/>
                     </a:solidFill>
@@ -14387,7 +14515,7 @@
               </a:ln>
               <a:extLst>
                 <a:ext uri="{91240B29-F687-4f45-9708-019B960494DF}">
-                  <a14:hiddenLine xmlns:a14="http://schemas.microsoft.com/office/drawing/2010/main" xmlns="" w="9525">
+                  <a14:hiddenLine xmlns="" xmlns:a14="http://schemas.microsoft.com/office/drawing/2010/main" w="9525">
                     <a:solidFill>
                       <a:srgbClr val="000000"/>
                     </a:solidFill>
@@ -14477,7 +14605,7 @@
               </a:ln>
               <a:extLst>
                 <a:ext uri="{91240B29-F687-4f45-9708-019B960494DF}">
-                  <a14:hiddenLine xmlns:a14="http://schemas.microsoft.com/office/drawing/2010/main" xmlns="" w="9525">
+                  <a14:hiddenLine xmlns="" xmlns:a14="http://schemas.microsoft.com/office/drawing/2010/main" w="9525">
                     <a:solidFill>
                       <a:srgbClr val="000000"/>
                     </a:solidFill>
@@ -14567,7 +14695,7 @@
               </a:ln>
               <a:extLst>
                 <a:ext uri="{91240B29-F687-4f45-9708-019B960494DF}">
-                  <a14:hiddenLine xmlns:a14="http://schemas.microsoft.com/office/drawing/2010/main" xmlns="" w="9525">
+                  <a14:hiddenLine xmlns="" xmlns:a14="http://schemas.microsoft.com/office/drawing/2010/main" w="9525">
                     <a:solidFill>
                       <a:srgbClr val="000000"/>
                     </a:solidFill>
@@ -14632,7 +14760,7 @@
               </a:ln>
               <a:extLst>
                 <a:ext uri="{91240B29-F687-4f45-9708-019B960494DF}">
-                  <a14:hiddenLine xmlns:a14="http://schemas.microsoft.com/office/drawing/2010/main" xmlns="" w="9525">
+                  <a14:hiddenLine xmlns="" xmlns:a14="http://schemas.microsoft.com/office/drawing/2010/main" w="9525">
                     <a:solidFill>
                       <a:srgbClr val="000000"/>
                     </a:solidFill>
@@ -14752,7 +14880,7 @@
               </a:ln>
               <a:extLst>
                 <a:ext uri="{91240B29-F687-4f45-9708-019B960494DF}">
-                  <a14:hiddenLine xmlns:a14="http://schemas.microsoft.com/office/drawing/2010/main" xmlns="" w="9525">
+                  <a14:hiddenLine xmlns="" xmlns:a14="http://schemas.microsoft.com/office/drawing/2010/main" w="9525">
                     <a:solidFill>
                       <a:srgbClr val="000000"/>
                     </a:solidFill>
@@ -14850,7 +14978,7 @@
               </a:ln>
               <a:extLst>
                 <a:ext uri="{91240B29-F687-4f45-9708-019B960494DF}">
-                  <a14:hiddenLine xmlns:a14="http://schemas.microsoft.com/office/drawing/2010/main" xmlns="" w="9525">
+                  <a14:hiddenLine xmlns="" xmlns:a14="http://schemas.microsoft.com/office/drawing/2010/main" w="9525">
                     <a:solidFill>
                       <a:srgbClr val="000000"/>
                     </a:solidFill>
@@ -14965,7 +15093,7 @@
               </a:ln>
               <a:extLst>
                 <a:ext uri="{91240B29-F687-4f45-9708-019B960494DF}">
-                  <a14:hiddenLine xmlns:a14="http://schemas.microsoft.com/office/drawing/2010/main" xmlns="" w="9525">
+                  <a14:hiddenLine xmlns="" xmlns:a14="http://schemas.microsoft.com/office/drawing/2010/main" w="9525">
                     <a:solidFill>
                       <a:srgbClr val="000000"/>
                     </a:solidFill>
@@ -15055,7 +15183,7 @@
               </a:ln>
               <a:extLst>
                 <a:ext uri="{91240B29-F687-4f45-9708-019B960494DF}">
-                  <a14:hiddenLine xmlns:a14="http://schemas.microsoft.com/office/drawing/2010/main" xmlns="" w="9525">
+                  <a14:hiddenLine xmlns="" xmlns:a14="http://schemas.microsoft.com/office/drawing/2010/main" w="9525">
                     <a:solidFill>
                       <a:srgbClr val="000000"/>
                     </a:solidFill>
@@ -15120,7 +15248,7 @@
               </a:ln>
               <a:extLst>
                 <a:ext uri="{91240B29-F687-4f45-9708-019B960494DF}">
-                  <a14:hiddenLine xmlns:a14="http://schemas.microsoft.com/office/drawing/2010/main" xmlns="" w="9525">
+                  <a14:hiddenLine xmlns="" xmlns:a14="http://schemas.microsoft.com/office/drawing/2010/main" w="9525">
                     <a:solidFill>
                       <a:srgbClr val="000000"/>
                     </a:solidFill>
@@ -15210,7 +15338,7 @@
               </a:ln>
               <a:extLst>
                 <a:ext uri="{91240B29-F687-4f45-9708-019B960494DF}">
-                  <a14:hiddenLine xmlns:a14="http://schemas.microsoft.com/office/drawing/2010/main" xmlns="" w="9525">
+                  <a14:hiddenLine xmlns="" xmlns:a14="http://schemas.microsoft.com/office/drawing/2010/main" w="9525">
                     <a:solidFill>
                       <a:srgbClr val="000000"/>
                     </a:solidFill>
@@ -15278,7 +15406,7 @@
               </a:ln>
               <a:extLst>
                 <a:ext uri="{91240B29-F687-4f45-9708-019B960494DF}">
-                  <a14:hiddenLine xmlns:a14="http://schemas.microsoft.com/office/drawing/2010/main" xmlns="" w="9525">
+                  <a14:hiddenLine xmlns="" xmlns:a14="http://schemas.microsoft.com/office/drawing/2010/main" w="9525">
                     <a:solidFill>
                       <a:srgbClr val="000000"/>
                     </a:solidFill>
@@ -15368,7 +15496,7 @@
               </a:ln>
               <a:extLst>
                 <a:ext uri="{91240B29-F687-4f45-9708-019B960494DF}">
-                  <a14:hiddenLine xmlns:a14="http://schemas.microsoft.com/office/drawing/2010/main" xmlns="" w="9525">
+                  <a14:hiddenLine xmlns="" xmlns:a14="http://schemas.microsoft.com/office/drawing/2010/main" w="9525">
                     <a:solidFill>
                       <a:srgbClr val="000000"/>
                     </a:solidFill>
@@ -15436,7 +15564,7 @@
               </a:ln>
               <a:extLst>
                 <a:ext uri="{91240B29-F687-4f45-9708-019B960494DF}">
-                  <a14:hiddenLine xmlns:a14="http://schemas.microsoft.com/office/drawing/2010/main" xmlns="" w="9525">
+                  <a14:hiddenLine xmlns="" xmlns:a14="http://schemas.microsoft.com/office/drawing/2010/main" w="9525">
                     <a:solidFill>
                       <a:srgbClr val="000000"/>
                     </a:solidFill>
@@ -15526,7 +15654,7 @@
               </a:ln>
               <a:extLst>
                 <a:ext uri="{91240B29-F687-4f45-9708-019B960494DF}">
-                  <a14:hiddenLine xmlns:a14="http://schemas.microsoft.com/office/drawing/2010/main" xmlns="" w="9525">
+                  <a14:hiddenLine xmlns="" xmlns:a14="http://schemas.microsoft.com/office/drawing/2010/main" w="9525">
                     <a:solidFill>
                       <a:srgbClr val="000000"/>
                     </a:solidFill>
@@ -15560,7 +15688,7 @@
               </a:ln>
               <a:extLst>
                 <a:ext uri="{91240B29-F687-4f45-9708-019B960494DF}">
-                  <a14:hiddenLine xmlns:a14="http://schemas.microsoft.com/office/drawing/2010/main" xmlns="" w="9525">
+                  <a14:hiddenLine xmlns="" xmlns:a14="http://schemas.microsoft.com/office/drawing/2010/main" w="9525">
                     <a:solidFill>
                       <a:srgbClr val="000000"/>
                     </a:solidFill>
@@ -24519,11 +24647,11 @@
           <a:p>
             <a:r>
               <a:rPr lang="de-DE" dirty="0"/>
-              <a:t>Ein NP-vollständiges Problem ist schwach NP-vollständig, wenn es einen pseudo-</a:t>
+              <a:t>Ein NP-vollständiges Problem ist schwach NP-vollständig, wenn es einen </a:t>
             </a:r>
             <a:r>
               <a:rPr lang="de-DE" dirty="0" err="1"/>
-              <a:t>polynimialen</a:t>
+              <a:t>pseudopolynomimiellen</a:t>
             </a:r>
             <a:r>
               <a:rPr lang="de-DE" dirty="0"/>
@@ -24536,7 +24664,15 @@
           <a:p>
             <a:r>
               <a:rPr lang="de-DE" dirty="0"/>
-              <a:t>Gibt es keinen pseudo-polynomialen Algorithmus, wird das Problem schwach NP-vollständig genannt.</a:t>
+              <a:t>Gibt es keinen </a:t>
+            </a:r>
+            <a:r>
+              <a:rPr lang="de-DE" dirty="0" err="1"/>
+              <a:t>pseudopolynomiellen</a:t>
+            </a:r>
+            <a:r>
+              <a:rPr lang="de-DE" dirty="0"/>
+              <a:t> Algorithmus, wird das Problem schwach NP-vollständig genannt.</a:t>
             </a:r>
           </a:p>
         </p:txBody>
@@ -24623,6 +24759,23 @@
             <a:r>
               <a:rPr lang="de-DE" dirty="0"/>
               <a:t>Warum ist Knappsack schwach NP-vollständig?</a:t>
+            </a:r>
+          </a:p>
+          <a:p>
+            <a:endParaRPr lang="de-DE" dirty="0"/>
+          </a:p>
+          <a:p>
+            <a:r>
+              <a:rPr lang="de-DE" dirty="0"/>
+              <a:t>Es gibt einen </a:t>
+            </a:r>
+            <a:r>
+              <a:rPr lang="de-DE" dirty="0" err="1"/>
+              <a:t>pseudopolynomiellen</a:t>
+            </a:r>
+            <a:r>
+              <a:rPr lang="de-DE" dirty="0"/>
+              <a:t> Algorithmus</a:t>
             </a:r>
           </a:p>
         </p:txBody>
@@ -24999,8 +25152,8 @@
           </a:p>
         </p:txBody>
       </p:sp>
-      <mc:AlternateContent xmlns:mc="http://schemas.openxmlformats.org/markup-compatibility/2006">
-        <mc:Choice xmlns:a14="http://schemas.microsoft.com/office/drawing/2010/main" Requires="a14">
+      <mc:AlternateContent xmlns:mc="http://schemas.openxmlformats.org/markup-compatibility/2006" xmlns:a14="http://schemas.microsoft.com/office/drawing/2010/main">
+        <mc:Choice Requires="a14">
           <p:sp>
             <p:nvSpPr>
               <p:cNvPr id="3" name="Inhaltsplatzhalter 2">
@@ -25134,7 +25287,7 @@
             </p:txBody>
           </p:sp>
         </mc:Choice>
-        <mc:Fallback>
+        <mc:Fallback xmlns="">
           <p:sp>
             <p:nvSpPr>
               <p:cNvPr id="3" name="Inhaltsplatzhalter 2">
@@ -25232,8 +25385,8 @@
           </a:p>
         </p:txBody>
       </p:sp>
-      <mc:AlternateContent xmlns:mc="http://schemas.openxmlformats.org/markup-compatibility/2006">
-        <mc:Choice xmlns:a14="http://schemas.microsoft.com/office/drawing/2010/main" Requires="a14">
+      <mc:AlternateContent xmlns:mc="http://schemas.openxmlformats.org/markup-compatibility/2006" xmlns:a14="http://schemas.microsoft.com/office/drawing/2010/main">
+        <mc:Choice Requires="a14">
           <p:sp>
             <p:nvSpPr>
               <p:cNvPr id="3" name="Inhaltsplatzhalter 2">
@@ -25331,7 +25484,7 @@
             </p:txBody>
           </p:sp>
         </mc:Choice>
-        <mc:Fallback>
+        <mc:Fallback xmlns="">
           <p:sp>
             <p:nvSpPr>
               <p:cNvPr id="3" name="Inhaltsplatzhalter 2">
@@ -25876,8 +26029,8 @@
           </a:p>
         </p:txBody>
       </p:sp>
-      <mc:AlternateContent xmlns:mc="http://schemas.openxmlformats.org/markup-compatibility/2006">
-        <mc:Choice xmlns:a14="http://schemas.microsoft.com/office/drawing/2010/main" Requires="a14">
+      <mc:AlternateContent xmlns:mc="http://schemas.openxmlformats.org/markup-compatibility/2006" xmlns:a14="http://schemas.microsoft.com/office/drawing/2010/main">
+        <mc:Choice Requires="a14">
           <p:sp>
             <p:nvSpPr>
               <p:cNvPr id="10" name="Textfeld 9">
@@ -26134,7 +26287,7 @@
             </p:txBody>
           </p:sp>
         </mc:Choice>
-        <mc:Fallback>
+        <mc:Fallback xmlns="">
           <p:sp>
             <p:nvSpPr>
               <p:cNvPr id="10" name="Textfeld 9">

</xml_diff>